<commit_message>
Failing For 2 Days
</commit_message>
<xml_diff>
--- a/Docs/Informal Approach.pptx
+++ b/Docs/Informal Approach.pptx
@@ -4967,7 +4967,7 @@
           <a:p>
             <a:fld id="{2C6C54B3-8739-4B45-B27D-283823334119}" type="datetimeFigureOut">
               <a:rPr lang="en-GB" smtClean="0"/>
-              <a:t>26/10/2015</a:t>
+              <a:t>27/03/2016</a:t>
             </a:fld>
             <a:endParaRPr lang="en-GB"/>
           </a:p>
@@ -5137,7 +5137,7 @@
           <a:p>
             <a:fld id="{2C6C54B3-8739-4B45-B27D-283823334119}" type="datetimeFigureOut">
               <a:rPr lang="en-GB" smtClean="0"/>
-              <a:t>26/10/2015</a:t>
+              <a:t>27/03/2016</a:t>
             </a:fld>
             <a:endParaRPr lang="en-GB"/>
           </a:p>
@@ -5324,7 +5324,7 @@
           <a:p>
             <a:fld id="{2C6C54B3-8739-4B45-B27D-283823334119}" type="datetimeFigureOut">
               <a:rPr lang="en-GB" smtClean="0"/>
-              <a:t>26/10/2015</a:t>
+              <a:t>27/03/2016</a:t>
             </a:fld>
             <a:endParaRPr lang="en-GB"/>
           </a:p>
@@ -5568,7 +5568,7 @@
           <a:p>
             <a:fld id="{2C6C54B3-8739-4B45-B27D-283823334119}" type="datetimeFigureOut">
               <a:rPr lang="en-GB" smtClean="0"/>
-              <a:t>26/10/2015</a:t>
+              <a:t>27/03/2016</a:t>
             </a:fld>
             <a:endParaRPr lang="en-GB"/>
           </a:p>
@@ -5814,7 +5814,7 @@
           <a:p>
             <a:fld id="{2C6C54B3-8739-4B45-B27D-283823334119}" type="datetimeFigureOut">
               <a:rPr lang="en-GB" smtClean="0"/>
-              <a:t>26/10/2015</a:t>
+              <a:t>27/03/2016</a:t>
             </a:fld>
             <a:endParaRPr lang="en-GB"/>
           </a:p>
@@ -6046,7 +6046,7 @@
           <a:p>
             <a:fld id="{2C6C54B3-8739-4B45-B27D-283823334119}" type="datetimeFigureOut">
               <a:rPr lang="en-GB" smtClean="0"/>
-              <a:t>26/10/2015</a:t>
+              <a:t>27/03/2016</a:t>
             </a:fld>
             <a:endParaRPr lang="en-GB"/>
           </a:p>
@@ -6413,7 +6413,7 @@
           <a:p>
             <a:fld id="{2C6C54B3-8739-4B45-B27D-283823334119}" type="datetimeFigureOut">
               <a:rPr lang="en-GB" smtClean="0"/>
-              <a:t>26/10/2015</a:t>
+              <a:t>27/03/2016</a:t>
             </a:fld>
             <a:endParaRPr lang="en-GB"/>
           </a:p>
@@ -6531,7 +6531,7 @@
           <a:p>
             <a:fld id="{2C6C54B3-8739-4B45-B27D-283823334119}" type="datetimeFigureOut">
               <a:rPr lang="en-GB" smtClean="0"/>
-              <a:t>26/10/2015</a:t>
+              <a:t>27/03/2016</a:t>
             </a:fld>
             <a:endParaRPr lang="en-GB"/>
           </a:p>
@@ -6626,7 +6626,7 @@
           <a:p>
             <a:fld id="{2C6C54B3-8739-4B45-B27D-283823334119}" type="datetimeFigureOut">
               <a:rPr lang="en-GB" smtClean="0"/>
-              <a:t>26/10/2015</a:t>
+              <a:t>27/03/2016</a:t>
             </a:fld>
             <a:endParaRPr lang="en-GB"/>
           </a:p>
@@ -6903,7 +6903,7 @@
           <a:p>
             <a:fld id="{2C6C54B3-8739-4B45-B27D-283823334119}" type="datetimeFigureOut">
               <a:rPr lang="en-GB" smtClean="0"/>
-              <a:t>26/10/2015</a:t>
+              <a:t>27/03/2016</a:t>
             </a:fld>
             <a:endParaRPr lang="en-GB"/>
           </a:p>
@@ -7156,7 +7156,7 @@
           <a:p>
             <a:fld id="{2C6C54B3-8739-4B45-B27D-283823334119}" type="datetimeFigureOut">
               <a:rPr lang="en-GB" smtClean="0"/>
-              <a:t>26/10/2015</a:t>
+              <a:t>27/03/2016</a:t>
             </a:fld>
             <a:endParaRPr lang="en-GB"/>
           </a:p>
@@ -7376,7 +7376,7 @@
           <a:p>
             <a:fld id="{2C6C54B3-8739-4B45-B27D-283823334119}" type="datetimeFigureOut">
               <a:rPr lang="en-GB" smtClean="0"/>
-              <a:t>26/10/2015</a:t>
+              <a:t>27/03/2016</a:t>
             </a:fld>
             <a:endParaRPr lang="en-GB"/>
           </a:p>
@@ -9585,7 +9585,7 @@
         <p:spPr>
           <a:xfrm>
             <a:off x="1052732" y="4006948"/>
-            <a:ext cx="2557303" cy="369332"/>
+            <a:ext cx="3594574" cy="369332"/>
           </a:xfrm>
           <a:prstGeom prst="rect">
             <a:avLst/>
@@ -9600,7 +9600,15 @@
           <a:p>
             <a:r>
               <a:rPr lang="en-US" dirty="0" smtClean="0"/>
-              <a:t>Find entity in Entity Table</a:t>
+              <a:t>Find entity in </a:t>
+            </a:r>
+            <a:r>
+              <a:rPr lang="en-US" dirty="0" smtClean="0"/>
+              <a:t>Entity-Category </a:t>
+            </a:r>
+            <a:r>
+              <a:rPr lang="en-US" dirty="0" err="1" smtClean="0"/>
+              <a:t>Gaph</a:t>
             </a:r>
             <a:endParaRPr lang="en-GB" dirty="0"/>
           </a:p>
@@ -9744,8 +9752,8 @@
         </p:nvCxnSpPr>
         <p:spPr>
           <a:xfrm rot="16200000" flipH="1">
-            <a:off x="1610983" y="5096680"/>
-            <a:ext cx="1444393" cy="3591"/>
+            <a:off x="2230704" y="4995594"/>
+            <a:ext cx="1444393" cy="205763"/>
           </a:xfrm>
           <a:prstGeom prst="bentConnector3">
             <a:avLst>
@@ -9780,7 +9788,7 @@
         <p:spPr>
           <a:xfrm>
             <a:off x="851107" y="5820673"/>
-            <a:ext cx="2967736" cy="369332"/>
+            <a:ext cx="4409349" cy="369332"/>
           </a:xfrm>
           <a:prstGeom prst="rect">
             <a:avLst/>
@@ -9795,7 +9803,11 @@
           <a:p>
             <a:r>
               <a:rPr lang="en-US" dirty="0" smtClean="0"/>
-              <a:t>Could Relate to Movies, Actor</a:t>
+              <a:t>Generated Categories: Actor, </a:t>
+            </a:r>
+            <a:r>
+              <a:rPr lang="en-US" dirty="0" err="1" smtClean="0"/>
+              <a:t>OwnerOfATeam</a:t>
             </a:r>
             <a:endParaRPr lang="en-GB" dirty="0"/>
           </a:p>
@@ -9845,7 +9857,7 @@
         <p:spPr>
           <a:xfrm>
             <a:off x="6630473" y="1018910"/>
-            <a:ext cx="3116174" cy="369332"/>
+            <a:ext cx="4878259" cy="369332"/>
           </a:xfrm>
           <a:prstGeom prst="rect">
             <a:avLst/>
@@ -9860,15 +9872,7 @@
           <a:p>
             <a:r>
               <a:rPr lang="en-US" dirty="0" smtClean="0"/>
-              <a:t>‘Profession’  in </a:t>
-            </a:r>
-            <a:r>
-              <a:rPr lang="en-US" dirty="0"/>
-              <a:t>C</a:t>
-            </a:r>
-            <a:r>
-              <a:rPr lang="en-US" dirty="0" smtClean="0"/>
-              <a:t>ategories Table</a:t>
+              <a:t>Find Base Predicate in the generated Predicate list</a:t>
             </a:r>
             <a:endParaRPr lang="en-GB" dirty="0"/>
           </a:p>
@@ -9885,8 +9889,8 @@
         </p:nvCxnSpPr>
         <p:spPr>
           <a:xfrm flipV="1">
-            <a:off x="3818843" y="5652036"/>
-            <a:ext cx="4607708" cy="353303"/>
+            <a:off x="5260456" y="5652036"/>
+            <a:ext cx="3166095" cy="353303"/>
           </a:xfrm>
           <a:prstGeom prst="bentConnector3">
             <a:avLst>
@@ -9921,7 +9925,7 @@
         <p:spPr>
           <a:xfrm>
             <a:off x="8426551" y="5467370"/>
-            <a:ext cx="3454279" cy="369332"/>
+            <a:ext cx="5477782" cy="369332"/>
           </a:xfrm>
           <a:prstGeom prst="rect">
             <a:avLst/>
@@ -9934,17 +9938,10 @@
           </a:bodyPr>
           <a:lstStyle/>
           <a:p>
+            <a:pPr lvl="2"/>
             <a:r>
               <a:rPr lang="en-US" dirty="0" smtClean="0"/>
-              <a:t>Profession x </a:t>
-            </a:r>
-            <a:r>
-              <a:rPr lang="en-US" dirty="0" err="1" smtClean="0"/>
-              <a:t>Shahrukh</a:t>
-            </a:r>
-            <a:r>
-              <a:rPr lang="en-US" dirty="0" smtClean="0"/>
-              <a:t> Khan= Actor</a:t>
+              <a:t>Categories Graph with Base Predicate as edges</a:t>
             </a:r>
             <a:endParaRPr lang="en-GB" dirty="0"/>
           </a:p>
@@ -9961,8 +9958,8 @@
         </p:nvCxnSpPr>
         <p:spPr>
           <a:xfrm rot="16200000" flipH="1">
-            <a:off x="7131561" y="2445240"/>
-            <a:ext cx="4079128" cy="1965131"/>
+            <a:off x="8077958" y="2379886"/>
+            <a:ext cx="4079128" cy="2095839"/>
           </a:xfrm>
           <a:prstGeom prst="bentConnector3">
             <a:avLst>
@@ -10057,16 +10054,13 @@
       <p:cxnSp>
         <p:nvCxnSpPr>
           <p:cNvPr id="70" name="Elbow Connector 69"/>
-          <p:cNvCxnSpPr>
-            <a:stCxn id="57" idx="0"/>
-            <a:endCxn id="68" idx="2"/>
-          </p:cNvCxnSpPr>
+          <p:cNvCxnSpPr/>
           <p:nvPr/>
         </p:nvCxnSpPr>
         <p:spPr>
           <a:xfrm rot="16200000" flipV="1">
-            <a:off x="7237512" y="2551190"/>
-            <a:ext cx="1577967" cy="4254393"/>
+            <a:off x="6582197" y="2358858"/>
+            <a:ext cx="1577967" cy="4804479"/>
           </a:xfrm>
           <a:prstGeom prst="bentConnector3">
             <a:avLst>
@@ -10290,7 +10284,7 @@
         </p:nvSpPr>
         <p:spPr>
           <a:xfrm>
-            <a:off x="7918932" y="1932238"/>
+            <a:off x="8694333" y="1895391"/>
             <a:ext cx="269626" cy="276999"/>
           </a:xfrm>
           <a:prstGeom prst="rect">
@@ -10366,7 +10360,7 @@
         </p:nvSpPr>
         <p:spPr>
           <a:xfrm>
-            <a:off x="7153958" y="4355221"/>
+            <a:off x="7214825" y="4461911"/>
             <a:ext cx="269626" cy="276999"/>
           </a:xfrm>
           <a:prstGeom prst="rect">

</xml_diff>